<commit_message>
Update implementasi graph dan tree.pptx
</commit_message>
<xml_diff>
--- a/Latihan 6/implementasi graph dan tree.pptx
+++ b/Latihan 6/implementasi graph dan tree.pptx
@@ -2877,7 +2877,7 @@
           </a:ln>
           <a:extLst>
             <a:ext uri="{C572A759-6A51-4108-AA02-DFA0A04FC94B}">
-              <ma14:wrappingTextBoxFlag xmlns="" xmlns:m="http://schemas.openxmlformats.org/officeDocument/2006/math" xmlns:a14="http://schemas.microsoft.com/office/drawing/2010/main" xmlns:ma14="http://schemas.microsoft.com/office/mac/drawingml/2011/main" val="1"/>
+              <ma14:wrappingTextBoxFlag xmlns:ma14="http://schemas.microsoft.com/office/mac/drawingml/2011/main" xmlns:a14="http://schemas.microsoft.com/office/drawing/2010/main" xmlns:m="http://schemas.openxmlformats.org/officeDocument/2006/math" xmlns="" val="1"/>
             </a:ext>
           </a:extLst>
         </p:spPr>
@@ -2916,7 +2916,7 @@
           </a:ln>
           <a:extLst>
             <a:ext uri="{C572A759-6A51-4108-AA02-DFA0A04FC94B}">
-              <ma14:wrappingTextBoxFlag xmlns="" xmlns:m="http://schemas.openxmlformats.org/officeDocument/2006/math" xmlns:a14="http://schemas.microsoft.com/office/drawing/2010/main" xmlns:ma14="http://schemas.microsoft.com/office/mac/drawingml/2011/main" val="1"/>
+              <ma14:wrappingTextBoxFlag xmlns:ma14="http://schemas.microsoft.com/office/mac/drawingml/2011/main" xmlns:a14="http://schemas.microsoft.com/office/drawing/2010/main" xmlns:m="http://schemas.openxmlformats.org/officeDocument/2006/math" xmlns="" val="1"/>
             </a:ext>
           </a:extLst>
         </p:spPr>
@@ -3757,7 +3757,7 @@
           </a:prstGeom>
           <a:extLst>
             <a:ext uri="{C572A759-6A51-4108-AA02-DFA0A04FC94B}">
-              <ma14:wrappingTextBoxFlag xmlns="" xmlns:m="http://schemas.openxmlformats.org/officeDocument/2006/math" xmlns:a14="http://schemas.microsoft.com/office/drawing/2010/main" xmlns:ma14="http://schemas.microsoft.com/office/mac/drawingml/2011/main" val="1"/>
+              <ma14:wrappingTextBoxFlag xmlns:ma14="http://schemas.microsoft.com/office/mac/drawingml/2011/main" xmlns:a14="http://schemas.microsoft.com/office/drawing/2010/main" xmlns:m="http://schemas.openxmlformats.org/officeDocument/2006/math" xmlns="" val="1"/>
             </a:ext>
           </a:extLst>
         </p:spPr>
@@ -15700,103 +15700,6 @@
           <a:fontRef idx="none"/>
         </p:style>
       </p:cxnSp>
-      <p:cxnSp>
-        <p:nvCxnSpPr>
-          <p:cNvPr id="77" name="Straight Arrow Connector 76">
-            <a:extLst>
-              <a:ext uri="{FF2B5EF4-FFF2-40B4-BE49-F238E27FC236}">
-                <a16:creationId xmlns:a16="http://schemas.microsoft.com/office/drawing/2014/main" id="{3200FD2B-3A7F-4C97-88E4-0351EDDD9311}"/>
-              </a:ext>
-            </a:extLst>
-          </p:cNvPr>
-          <p:cNvCxnSpPr>
-            <a:stCxn id="25" idx="7"/>
-            <a:endCxn id="31" idx="3"/>
-          </p:cNvCxnSpPr>
-          <p:nvPr/>
-        </p:nvCxnSpPr>
-        <p:spPr>
-          <a:xfrm flipV="1">
-            <a:off x="18474901" y="4411450"/>
-            <a:ext cx="2111150" cy="1891030"/>
-          </a:xfrm>
-          <a:prstGeom prst="straightConnector1">
-            <a:avLst/>
-          </a:prstGeom>
-          <a:noFill/>
-          <a:ln w="25400" cap="flat">
-            <a:solidFill>
-              <a:srgbClr val="FF0000"/>
-            </a:solidFill>
-            <a:prstDash val="solid"/>
-            <a:miter lim="400000"/>
-            <a:tailEnd type="triangle"/>
-          </a:ln>
-          <a:effectLst/>
-          <a:sp3d/>
-        </p:spPr>
-        <p:style>
-          <a:lnRef idx="0">
-            <a:scrgbClr r="0" g="0" b="0"/>
-          </a:lnRef>
-          <a:fillRef idx="0">
-            <a:scrgbClr r="0" g="0" b="0"/>
-          </a:fillRef>
-          <a:effectRef idx="0">
-            <a:scrgbClr r="0" g="0" b="0"/>
-          </a:effectRef>
-          <a:fontRef idx="none"/>
-        </p:style>
-      </p:cxnSp>
-      <p:cxnSp>
-        <p:nvCxnSpPr>
-          <p:cNvPr id="79" name="Straight Arrow Connector 78">
-            <a:extLst>
-              <a:ext uri="{FF2B5EF4-FFF2-40B4-BE49-F238E27FC236}">
-                <a16:creationId xmlns:a16="http://schemas.microsoft.com/office/drawing/2014/main" id="{845CBE85-92BF-4EB7-B4A5-2CFC31D7F1B7}"/>
-              </a:ext>
-            </a:extLst>
-          </p:cNvPr>
-          <p:cNvCxnSpPr>
-            <a:cxnSpLocks/>
-            <a:stCxn id="30" idx="0"/>
-            <a:endCxn id="31" idx="4"/>
-          </p:cNvCxnSpPr>
-          <p:nvPr/>
-        </p:nvCxnSpPr>
-        <p:spPr>
-          <a:xfrm flipV="1">
-            <a:off x="21375182" y="4628339"/>
-            <a:ext cx="0" cy="1489153"/>
-          </a:xfrm>
-          <a:prstGeom prst="straightConnector1">
-            <a:avLst/>
-          </a:prstGeom>
-          <a:noFill/>
-          <a:ln w="25400" cap="flat">
-            <a:solidFill>
-              <a:srgbClr val="FF0000"/>
-            </a:solidFill>
-            <a:prstDash val="solid"/>
-            <a:miter lim="400000"/>
-            <a:tailEnd type="triangle"/>
-          </a:ln>
-          <a:effectLst/>
-          <a:sp3d/>
-        </p:spPr>
-        <p:style>
-          <a:lnRef idx="0">
-            <a:scrgbClr r="0" g="0" b="0"/>
-          </a:lnRef>
-          <a:fillRef idx="0">
-            <a:scrgbClr r="0" g="0" b="0"/>
-          </a:fillRef>
-          <a:effectRef idx="0">
-            <a:scrgbClr r="0" g="0" b="0"/>
-          </a:effectRef>
-          <a:fontRef idx="none"/>
-        </p:style>
-      </p:cxnSp>
     </p:spTree>
     <p:extLst>
       <p:ext uri="{BB962C8B-B14F-4D97-AF65-F5344CB8AC3E}">
@@ -15828,42 +15731,6 @@
           <a:chExt cx="0" cy="0"/>
         </a:xfrm>
       </p:grpSpPr>
-      <p:pic>
-        <p:nvPicPr>
-          <p:cNvPr id="44" name="Picture 43">
-            <a:extLst>
-              <a:ext uri="{FF2B5EF4-FFF2-40B4-BE49-F238E27FC236}">
-                <a16:creationId xmlns:a16="http://schemas.microsoft.com/office/drawing/2014/main" id="{BBB68B28-01CA-4FBF-8ECD-F53CA4AB42DC}"/>
-              </a:ext>
-            </a:extLst>
-          </p:cNvPr>
-          <p:cNvPicPr>
-            <a:picLocks noChangeAspect="1"/>
-          </p:cNvPicPr>
-          <p:nvPr/>
-        </p:nvPicPr>
-        <p:blipFill>
-          <a:blip r:embed="rId2">
-            <a:extLst>
-              <a:ext uri="{28A0092B-C50C-407E-A947-70E740481C1C}">
-                <a14:useLocalDpi xmlns:a14="http://schemas.microsoft.com/office/drawing/2010/main" val="0"/>
-              </a:ext>
-            </a:extLst>
-          </a:blip>
-          <a:stretch>
-            <a:fillRect/>
-          </a:stretch>
-        </p:blipFill>
-        <p:spPr>
-          <a:xfrm>
-            <a:off x="1863318" y="3154048"/>
-            <a:ext cx="20657361" cy="7407903"/>
-          </a:xfrm>
-          <a:prstGeom prst="rect">
-            <a:avLst/>
-          </a:prstGeom>
-        </p:spPr>
-      </p:pic>
       <p:sp>
         <p:nvSpPr>
           <p:cNvPr id="6" name="TextBox 5">
@@ -22927,12 +22794,6 @@
 </file>
 
 <file path=customXml/item1.xml><?xml version="1.0" encoding="utf-8"?>
-<p:properties xmlns:p="http://schemas.microsoft.com/office/2006/metadata/properties" xmlns:xsi="http://www.w3.org/2001/XMLSchema-instance" xmlns:pc="http://schemas.microsoft.com/office/infopath/2007/PartnerControls">
-  <documentManagement/>
-</p:properties>
-</file>
-
-<file path=customXml/item2.xml><?xml version="1.0" encoding="utf-8"?>
 <ct:contentTypeSchema xmlns:ct="http://schemas.microsoft.com/office/2006/metadata/contentType" xmlns:ma="http://schemas.microsoft.com/office/2006/metadata/properties/metaAttributes" ct:_="" ma:_="" ma:contentTypeName="Document" ma:contentTypeID="0x010100C95E54C855EC78418D00BFDBA37285E2" ma:contentTypeVersion="10" ma:contentTypeDescription="Create a new document." ma:contentTypeScope="" ma:versionID="6f573b1a45794110d2113225073deebc">
   <xsd:schema xmlns:xsd="http://www.w3.org/2001/XMLSchema" xmlns:xs="http://www.w3.org/2001/XMLSchema" xmlns:p="http://schemas.microsoft.com/office/2006/metadata/properties" xmlns:ns2="e5222402-7b9f-4113-8b8c-ea94d66e8e91" xmlns:ns3="77543c93-e606-407f-9220-765fca0937f2" targetNamespace="http://schemas.microsoft.com/office/2006/metadata/properties" ma:root="true" ma:fieldsID="09add58877d63566cf6918206b064d01" ns2:_="" ns3:_="">
     <xsd:import namespace="e5222402-7b9f-4113-8b8c-ea94d66e8e91"/>
@@ -23135,6 +22996,12 @@
 </ct:contentTypeSchema>
 </file>
 
+<file path=customXml/item2.xml><?xml version="1.0" encoding="utf-8"?>
+<p:properties xmlns:p="http://schemas.microsoft.com/office/2006/metadata/properties" xmlns:xsi="http://www.w3.org/2001/XMLSchema-instance" xmlns:pc="http://schemas.microsoft.com/office/infopath/2007/PartnerControls">
+  <documentManagement/>
+</p:properties>
+</file>
+
 <file path=customXml/item3.xml><?xml version="1.0" encoding="utf-8"?>
 <?mso-contentType ?>
 <FormTemplates xmlns="http://schemas.microsoft.com/sharepoint/v3/contenttype/forms">
@@ -23145,15 +23012,6 @@
 </file>
 
 <file path=customXml/itemProps1.xml><?xml version="1.0" encoding="utf-8"?>
-<ds:datastoreItem xmlns:ds="http://schemas.openxmlformats.org/officeDocument/2006/customXml" ds:itemID="{0B24D49F-F276-498D-A24D-B13464F5F0FE}">
-  <ds:schemaRefs>
-    <ds:schemaRef ds:uri="http://schemas.microsoft.com/office/2006/metadata/properties"/>
-    <ds:schemaRef ds:uri="http://schemas.microsoft.com/office/infopath/2007/PartnerControls"/>
-  </ds:schemaRefs>
-</ds:datastoreItem>
-</file>
-
-<file path=customXml/itemProps2.xml><?xml version="1.0" encoding="utf-8"?>
 <ds:datastoreItem xmlns:ds="http://schemas.openxmlformats.org/officeDocument/2006/customXml" ds:itemID="{EF189A91-6186-401E-99D4-B55CF2D4C04A}">
   <ds:schemaRefs>
     <ds:schemaRef ds:uri="http://schemas.microsoft.com/office/2006/metadata/contentType"/>
@@ -23172,6 +23030,15 @@
 </ds:datastoreItem>
 </file>
 
+<file path=customXml/itemProps2.xml><?xml version="1.0" encoding="utf-8"?>
+<ds:datastoreItem xmlns:ds="http://schemas.openxmlformats.org/officeDocument/2006/customXml" ds:itemID="{0B24D49F-F276-498D-A24D-B13464F5F0FE}">
+  <ds:schemaRefs>
+    <ds:schemaRef ds:uri="http://schemas.microsoft.com/office/2006/metadata/properties"/>
+    <ds:schemaRef ds:uri="http://schemas.microsoft.com/office/infopath/2007/PartnerControls"/>
+  </ds:schemaRefs>
+</ds:datastoreItem>
+</file>
+
 <file path=customXml/itemProps3.xml><?xml version="1.0" encoding="utf-8"?>
 <ds:datastoreItem xmlns:ds="http://schemas.openxmlformats.org/officeDocument/2006/customXml" ds:itemID="{7DF2CD51-6DB2-48C4-8BB2-FE46CBA753F9}">
   <ds:schemaRefs>

</xml_diff>